<commit_message>
Adds patent, paper infos to portfolio.
</commit_message>
<xml_diff>
--- a/pptx/Portfolio.pptx
+++ b/pptx/Portfolio.pptx
@@ -5,7 +5,7 @@
     <p:sldMasterId id="2147483648" r:id="rId1"/>
   </p:sldMasterIdLst>
   <p:notesMasterIdLst>
-    <p:notesMasterId r:id="rId44"/>
+    <p:notesMasterId r:id="rId45"/>
   </p:notesMasterIdLst>
   <p:sldIdLst>
     <p:sldId id="257" r:id="rId2"/>
@@ -46,26 +46,27 @@
     <p:sldId id="449" r:id="rId37"/>
     <p:sldId id="450" r:id="rId38"/>
     <p:sldId id="451" r:id="rId39"/>
-    <p:sldId id="452" r:id="rId40"/>
-    <p:sldId id="454" r:id="rId41"/>
-    <p:sldId id="456" r:id="rId42"/>
-    <p:sldId id="463" r:id="rId43"/>
+    <p:sldId id="466" r:id="rId40"/>
+    <p:sldId id="452" r:id="rId41"/>
+    <p:sldId id="454" r:id="rId42"/>
+    <p:sldId id="456" r:id="rId43"/>
+    <p:sldId id="463" r:id="rId44"/>
   </p:sldIdLst>
   <p:sldSz cx="12192000" cy="6858000"/>
   <p:notesSz cx="9926638" cy="6797675"/>
   <p:embeddedFontLst>
     <p:embeddedFont>
       <p:font typeface="나눔스퀘어" panose="020B0600000101010101" pitchFamily="50" charset="-127"/>
-      <p:regular r:id="rId45"/>
+      <p:regular r:id="rId46"/>
     </p:embeddedFont>
     <p:embeddedFont>
       <p:font typeface="나눔스퀘어 Bold" panose="020B0600000101010101" pitchFamily="50" charset="-127"/>
-      <p:bold r:id="rId46"/>
+      <p:bold r:id="rId47"/>
     </p:embeddedFont>
     <p:embeddedFont>
       <p:font typeface="맑은 고딕" panose="020B0503020000020004" pitchFamily="50" charset="-127"/>
-      <p:regular r:id="rId47"/>
-      <p:bold r:id="rId48"/>
+      <p:regular r:id="rId48"/>
+      <p:bold r:id="rId49"/>
     </p:embeddedFont>
   </p:embeddedFontLst>
   <p:defaultTextStyle>
@@ -276,7 +277,7 @@
           <a:p>
             <a:fld id="{289194AB-EBD5-4C9B-9331-55B48D2D255A}" type="datetimeFigureOut">
               <a:rPr lang="ko-KR" altLang="en-US" smtClean="0"/>
-              <a:t>2019-09-18</a:t>
+              <a:t>2019-09-26</a:t>
             </a:fld>
             <a:endParaRPr lang="ko-KR" altLang="en-US"/>
           </a:p>
@@ -3640,7 +3641,7 @@
     </p:spTree>
     <p:extLst>
       <p:ext uri="{BB962C8B-B14F-4D97-AF65-F5344CB8AC3E}">
-        <p14:creationId xmlns:p14="http://schemas.microsoft.com/office/powerpoint/2010/main" val="3926374152"/>
+        <p14:creationId xmlns:p14="http://schemas.microsoft.com/office/powerpoint/2010/main" val="1530880801"/>
       </p:ext>
     </p:extLst>
   </p:cSld>
@@ -3828,7 +3829,7 @@
     </p:spTree>
     <p:extLst>
       <p:ext uri="{BB962C8B-B14F-4D97-AF65-F5344CB8AC3E}">
-        <p14:creationId xmlns:p14="http://schemas.microsoft.com/office/powerpoint/2010/main" val="2539548900"/>
+        <p14:creationId xmlns:p14="http://schemas.microsoft.com/office/powerpoint/2010/main" val="3926374152"/>
       </p:ext>
     </p:extLst>
   </p:cSld>
@@ -3922,7 +3923,7 @@
     </p:spTree>
     <p:extLst>
       <p:ext uri="{BB962C8B-B14F-4D97-AF65-F5344CB8AC3E}">
-        <p14:creationId xmlns:p14="http://schemas.microsoft.com/office/powerpoint/2010/main" val="3875738188"/>
+        <p14:creationId xmlns:p14="http://schemas.microsoft.com/office/powerpoint/2010/main" val="2539548900"/>
       </p:ext>
     </p:extLst>
   </p:cSld>
@@ -4008,6 +4009,100 @@
               <a:rPr lang="ko-KR" altLang="en-US" smtClean="0"/>
               <a:pPr/>
               <a:t>42</a:t>
+            </a:fld>
+            <a:endParaRPr lang="ko-KR" altLang="en-US"/>
+          </a:p>
+        </p:txBody>
+      </p:sp>
+    </p:spTree>
+    <p:extLst>
+      <p:ext uri="{BB962C8B-B14F-4D97-AF65-F5344CB8AC3E}">
+        <p14:creationId xmlns:p14="http://schemas.microsoft.com/office/powerpoint/2010/main" val="3875738188"/>
+      </p:ext>
+    </p:extLst>
+  </p:cSld>
+  <p:clrMapOvr>
+    <a:masterClrMapping/>
+  </p:clrMapOvr>
+</p:notes>
+</file>
+
+<file path=ppt/notesSlides/notesSlide43.xml><?xml version="1.0" encoding="utf-8"?>
+<p:notes xmlns:a="http://schemas.openxmlformats.org/drawingml/2006/main" xmlns:r="http://schemas.openxmlformats.org/officeDocument/2006/relationships" xmlns:p="http://schemas.openxmlformats.org/presentationml/2006/main">
+  <p:cSld>
+    <p:spTree>
+      <p:nvGrpSpPr>
+        <p:cNvPr id="1" name=""/>
+        <p:cNvGrpSpPr/>
+        <p:nvPr/>
+      </p:nvGrpSpPr>
+      <p:grpSpPr>
+        <a:xfrm>
+          <a:off x="0" y="0"/>
+          <a:ext cx="0" cy="0"/>
+          <a:chOff x="0" y="0"/>
+          <a:chExt cx="0" cy="0"/>
+        </a:xfrm>
+      </p:grpSpPr>
+      <p:sp>
+        <p:nvSpPr>
+          <p:cNvPr id="2" name="슬라이드 이미지 개체 틀 1"/>
+          <p:cNvSpPr>
+            <a:spLocks noGrp="1" noRot="1" noChangeAspect="1"/>
+          </p:cNvSpPr>
+          <p:nvPr>
+            <p:ph type="sldImg"/>
+          </p:nvPr>
+        </p:nvSpPr>
+        <p:spPr/>
+      </p:sp>
+      <p:sp>
+        <p:nvSpPr>
+          <p:cNvPr id="3" name="슬라이드 노트 개체 틀 2"/>
+          <p:cNvSpPr>
+            <a:spLocks noGrp="1"/>
+          </p:cNvSpPr>
+          <p:nvPr>
+            <p:ph type="body" idx="1"/>
+          </p:nvPr>
+        </p:nvSpPr>
+        <p:spPr/>
+        <p:txBody>
+          <a:bodyPr/>
+          <a:lstStyle/>
+          <a:p>
+            <a:pPr latinLnBrk="1"/>
+            <a:endParaRPr lang="ko-KR" altLang="ko-KR" sz="1200" kern="1200" dirty="0">
+              <a:solidFill>
+                <a:schemeClr val="tx1"/>
+              </a:solidFill>
+              <a:effectLst/>
+              <a:latin typeface="+mn-lt"/>
+              <a:ea typeface="+mn-ea"/>
+              <a:cs typeface="+mn-cs"/>
+            </a:endParaRPr>
+          </a:p>
+        </p:txBody>
+      </p:sp>
+      <p:sp>
+        <p:nvSpPr>
+          <p:cNvPr id="4" name="슬라이드 번호 개체 틀 3"/>
+          <p:cNvSpPr>
+            <a:spLocks noGrp="1"/>
+          </p:cNvSpPr>
+          <p:nvPr>
+            <p:ph type="sldNum" sz="quarter" idx="10"/>
+          </p:nvPr>
+        </p:nvSpPr>
+        <p:spPr/>
+        <p:txBody>
+          <a:bodyPr/>
+          <a:lstStyle/>
+          <a:p>
+            <a:fld id="{7A90B051-D010-49EC-8A03-DFAA2746BC84}" type="slidenum">
+              <a:rPr lang="ko-KR" altLang="en-US" smtClean="0"/>
+              <a:pPr/>
+              <a:t>43</a:t>
             </a:fld>
             <a:endParaRPr lang="ko-KR" altLang="en-US"/>
           </a:p>
@@ -4643,7 +4738,7 @@
           <a:p>
             <a:fld id="{77308D10-E0FB-4115-BFA1-6152615C391E}" type="datetimeFigureOut">
               <a:rPr lang="ko-KR" altLang="en-US" smtClean="0"/>
-              <a:t>2019-09-18</a:t>
+              <a:t>2019-09-26</a:t>
             </a:fld>
             <a:endParaRPr lang="ko-KR" altLang="en-US"/>
           </a:p>
@@ -4841,7 +4936,7 @@
           <a:p>
             <a:fld id="{77308D10-E0FB-4115-BFA1-6152615C391E}" type="datetimeFigureOut">
               <a:rPr lang="ko-KR" altLang="en-US" smtClean="0"/>
-              <a:t>2019-09-18</a:t>
+              <a:t>2019-09-26</a:t>
             </a:fld>
             <a:endParaRPr lang="ko-KR" altLang="en-US"/>
           </a:p>
@@ -5049,7 +5144,7 @@
           <a:p>
             <a:fld id="{77308D10-E0FB-4115-BFA1-6152615C391E}" type="datetimeFigureOut">
               <a:rPr lang="ko-KR" altLang="en-US" smtClean="0"/>
-              <a:t>2019-09-18</a:t>
+              <a:t>2019-09-26</a:t>
             </a:fld>
             <a:endParaRPr lang="ko-KR" altLang="en-US"/>
           </a:p>
@@ -5247,7 +5342,7 @@
           <a:p>
             <a:fld id="{77308D10-E0FB-4115-BFA1-6152615C391E}" type="datetimeFigureOut">
               <a:rPr lang="ko-KR" altLang="en-US" smtClean="0"/>
-              <a:t>2019-09-18</a:t>
+              <a:t>2019-09-26</a:t>
             </a:fld>
             <a:endParaRPr lang="ko-KR" altLang="en-US"/>
           </a:p>
@@ -5522,7 +5617,7 @@
           <a:p>
             <a:fld id="{77308D10-E0FB-4115-BFA1-6152615C391E}" type="datetimeFigureOut">
               <a:rPr lang="ko-KR" altLang="en-US" smtClean="0"/>
-              <a:t>2019-09-18</a:t>
+              <a:t>2019-09-26</a:t>
             </a:fld>
             <a:endParaRPr lang="ko-KR" altLang="en-US"/>
           </a:p>
@@ -5787,7 +5882,7 @@
           <a:p>
             <a:fld id="{77308D10-E0FB-4115-BFA1-6152615C391E}" type="datetimeFigureOut">
               <a:rPr lang="ko-KR" altLang="en-US" smtClean="0"/>
-              <a:t>2019-09-18</a:t>
+              <a:t>2019-09-26</a:t>
             </a:fld>
             <a:endParaRPr lang="ko-KR" altLang="en-US"/>
           </a:p>
@@ -6199,7 +6294,7 @@
           <a:p>
             <a:fld id="{77308D10-E0FB-4115-BFA1-6152615C391E}" type="datetimeFigureOut">
               <a:rPr lang="ko-KR" altLang="en-US" smtClean="0"/>
-              <a:t>2019-09-18</a:t>
+              <a:t>2019-09-26</a:t>
             </a:fld>
             <a:endParaRPr lang="ko-KR" altLang="en-US"/>
           </a:p>
@@ -6340,7 +6435,7 @@
           <a:p>
             <a:fld id="{77308D10-E0FB-4115-BFA1-6152615C391E}" type="datetimeFigureOut">
               <a:rPr lang="ko-KR" altLang="en-US" smtClean="0"/>
-              <a:t>2019-09-18</a:t>
+              <a:t>2019-09-26</a:t>
             </a:fld>
             <a:endParaRPr lang="ko-KR" altLang="en-US"/>
           </a:p>
@@ -6453,7 +6548,7 @@
           <a:p>
             <a:fld id="{77308D10-E0FB-4115-BFA1-6152615C391E}" type="datetimeFigureOut">
               <a:rPr lang="ko-KR" altLang="en-US" smtClean="0"/>
-              <a:t>2019-09-18</a:t>
+              <a:t>2019-09-26</a:t>
             </a:fld>
             <a:endParaRPr lang="ko-KR" altLang="en-US"/>
           </a:p>
@@ -6764,7 +6859,7 @@
           <a:p>
             <a:fld id="{77308D10-E0FB-4115-BFA1-6152615C391E}" type="datetimeFigureOut">
               <a:rPr lang="ko-KR" altLang="en-US" smtClean="0"/>
-              <a:t>2019-09-18</a:t>
+              <a:t>2019-09-26</a:t>
             </a:fld>
             <a:endParaRPr lang="ko-KR" altLang="en-US"/>
           </a:p>
@@ -7052,7 +7147,7 @@
           <a:p>
             <a:fld id="{77308D10-E0FB-4115-BFA1-6152615C391E}" type="datetimeFigureOut">
               <a:rPr lang="ko-KR" altLang="en-US" smtClean="0"/>
-              <a:t>2019-09-18</a:t>
+              <a:t>2019-09-26</a:t>
             </a:fld>
             <a:endParaRPr lang="ko-KR" altLang="en-US"/>
           </a:p>
@@ -7293,7 +7388,7 @@
           <a:p>
             <a:fld id="{77308D10-E0FB-4115-BFA1-6152615C391E}" type="datetimeFigureOut">
               <a:rPr lang="ko-KR" altLang="en-US" smtClean="0"/>
-              <a:t>2019-09-18</a:t>
+              <a:t>2019-09-26</a:t>
             </a:fld>
             <a:endParaRPr lang="ko-KR" altLang="en-US"/>
           </a:p>
@@ -16153,7 +16248,7 @@
                 <a:ea typeface="나눔바른고딕" panose="020B0603020101020101" pitchFamily="50" charset="-127"/>
                 <a:sym typeface="Wingdings" panose="05000000000000000000" pitchFamily="2" charset="2"/>
               </a:rPr>
-              <a:t>2. Papers</a:t>
+              <a:t>2. Papers / Patents</a:t>
             </a:r>
           </a:p>
           <a:p>
@@ -33025,7 +33120,7 @@
               <a:rPr lang="en-US" altLang="ko-KR" sz="3600" dirty="0">
                 <a:cs typeface="Calibri" panose="020F0502020204030204" pitchFamily="34" charset="0"/>
               </a:rPr>
-              <a:t>2. Papers</a:t>
+              <a:t>2. Papers / Patents</a:t>
             </a:r>
           </a:p>
         </p:txBody>
@@ -33090,7 +33185,7 @@
         <p:spPr>
           <a:xfrm>
             <a:off x="2396284" y="1649529"/>
-            <a:ext cx="6595316" cy="2545377"/>
+            <a:ext cx="6595316" cy="4207370"/>
           </a:xfrm>
           <a:prstGeom prst="rect">
             <a:avLst/>
@@ -33111,7 +33206,7 @@
             </a:pPr>
             <a:r>
               <a:rPr lang="en-US" altLang="ko-KR" dirty="0"/>
-              <a:t>Journal</a:t>
+              <a:t>Papers</a:t>
             </a:r>
           </a:p>
           <a:p>
@@ -33124,7 +33219,33 @@
             </a:pPr>
             <a:r>
               <a:rPr lang="en-US" altLang="ko-KR" dirty="0"/>
+              <a:t>Journal</a:t>
+            </a:r>
+          </a:p>
+          <a:p>
+            <a:pPr marL="1200150" lvl="2" indent="-285750">
+              <a:lnSpc>
+                <a:spcPct val="150000"/>
+              </a:lnSpc>
+              <a:buFont typeface="Arial" panose="020B0604020202020204" pitchFamily="34" charset="0"/>
+              <a:buChar char="•"/>
+            </a:pPr>
+            <a:r>
+              <a:rPr lang="en-US" altLang="ko-KR" dirty="0"/>
               <a:t>International</a:t>
+            </a:r>
+          </a:p>
+          <a:p>
+            <a:pPr marL="1200150" lvl="2" indent="-285750">
+              <a:lnSpc>
+                <a:spcPct val="150000"/>
+              </a:lnSpc>
+              <a:buFont typeface="Arial" panose="020B0604020202020204" pitchFamily="34" charset="0"/>
+              <a:buChar char="•"/>
+            </a:pPr>
+            <a:r>
+              <a:rPr lang="en-US" altLang="ko-KR" dirty="0"/>
+              <a:t>Domestic</a:t>
             </a:r>
           </a:p>
           <a:p>
@@ -33137,6 +33258,32 @@
             </a:pPr>
             <a:r>
               <a:rPr lang="en-US" altLang="ko-KR" dirty="0"/>
+              <a:t>Conference</a:t>
+            </a:r>
+          </a:p>
+          <a:p>
+            <a:pPr marL="1200150" lvl="2" indent="-285750">
+              <a:lnSpc>
+                <a:spcPct val="150000"/>
+              </a:lnSpc>
+              <a:buFont typeface="Arial" panose="020B0604020202020204" pitchFamily="34" charset="0"/>
+              <a:buChar char="•"/>
+            </a:pPr>
+            <a:r>
+              <a:rPr lang="en-US" altLang="ko-KR" dirty="0"/>
+              <a:t>International</a:t>
+            </a:r>
+          </a:p>
+          <a:p>
+            <a:pPr marL="1200150" lvl="2" indent="-285750">
+              <a:lnSpc>
+                <a:spcPct val="150000"/>
+              </a:lnSpc>
+              <a:buFont typeface="Arial" panose="020B0604020202020204" pitchFamily="34" charset="0"/>
+              <a:buChar char="•"/>
+            </a:pPr>
+            <a:r>
+              <a:rPr lang="en-US" altLang="ko-KR" dirty="0"/>
               <a:t>Domestic</a:t>
             </a:r>
           </a:p>
@@ -33150,7 +33297,7 @@
             </a:pPr>
             <a:r>
               <a:rPr lang="en-US" altLang="ko-KR" dirty="0"/>
-              <a:t>Conference</a:t>
+              <a:t>Patents</a:t>
             </a:r>
           </a:p>
           <a:p>
@@ -33743,7 +33890,7 @@
         <p:spPr>
           <a:xfrm>
             <a:off x="429370" y="1015118"/>
-            <a:ext cx="11526982" cy="3016210"/>
+            <a:ext cx="11526982" cy="4524315"/>
           </a:xfrm>
           <a:prstGeom prst="rect">
             <a:avLst/>
@@ -33874,6 +34021,83 @@
             <a:endParaRPr lang="en-US" altLang="ko-KR" sz="1400" dirty="0"/>
           </a:p>
           <a:p>
+            <a:pPr marL="1200150" lvl="2" indent="-285750" fontAlgn="base">
+              <a:buFont typeface="Arial" panose="020B0604020202020204" pitchFamily="34" charset="0"/>
+              <a:buChar char="•"/>
+            </a:pPr>
+            <a:r>
+              <a:rPr lang="en-US" altLang="ko-KR" sz="1400" dirty="0" err="1"/>
+              <a:t>OurRocks</a:t>
+            </a:r>
+            <a:r>
+              <a:rPr lang="en-US" altLang="ko-KR" sz="1400" dirty="0"/>
+              <a:t>: Offloading disk scan directly to GPU in Write-optimized database system</a:t>
+            </a:r>
+          </a:p>
+          <a:p>
+            <a:pPr marL="1657350" lvl="3" indent="-285750" fontAlgn="base">
+              <a:buFont typeface="Arial" panose="020B0604020202020204" pitchFamily="34" charset="0"/>
+              <a:buChar char="•"/>
+            </a:pPr>
+            <a:r>
+              <a:rPr lang="en-US" altLang="ko-KR" sz="1400" dirty="0"/>
+              <a:t>Won Gi Choi, </a:t>
+            </a:r>
+            <a:r>
+              <a:rPr lang="en-US" altLang="ko-KR" sz="1400" u="sng" dirty="0" err="1"/>
+              <a:t>Doyoung</a:t>
+            </a:r>
+            <a:r>
+              <a:rPr lang="en-US" altLang="ko-KR" sz="1400" u="sng" dirty="0"/>
+              <a:t> Kim</a:t>
+            </a:r>
+            <a:r>
+              <a:rPr lang="en-US" altLang="ko-KR" sz="1400" dirty="0"/>
+              <a:t>, </a:t>
+            </a:r>
+            <a:r>
+              <a:rPr lang="en-US" altLang="ko-KR" sz="1400" dirty="0" err="1"/>
+              <a:t>Hongchan</a:t>
+            </a:r>
+            <a:r>
+              <a:rPr lang="en-US" altLang="ko-KR" sz="1400" dirty="0"/>
+              <a:t> </a:t>
+            </a:r>
+            <a:r>
+              <a:rPr lang="en-US" altLang="ko-KR" sz="1400" dirty="0" err="1"/>
+              <a:t>Roh</a:t>
+            </a:r>
+            <a:r>
+              <a:rPr lang="en-US" altLang="ko-KR" sz="1400" dirty="0"/>
+              <a:t>, Sanghyun Park</a:t>
+            </a:r>
+          </a:p>
+          <a:p>
+            <a:pPr marL="1657350" lvl="3" indent="-285750" fontAlgn="base">
+              <a:buFont typeface="Arial" panose="020B0604020202020204" pitchFamily="34" charset="0"/>
+              <a:buChar char="•"/>
+            </a:pPr>
+            <a:r>
+              <a:rPr lang="en-US" altLang="ko-KR" sz="1400" dirty="0"/>
+              <a:t>On</a:t>
+            </a:r>
+            <a:r>
+              <a:rPr lang="ko-KR" altLang="en-US" sz="1400" dirty="0"/>
+              <a:t> </a:t>
+            </a:r>
+            <a:r>
+              <a:rPr lang="en-US" altLang="ko-KR" sz="1400" dirty="0"/>
+              <a:t>Writing…</a:t>
+            </a:r>
+          </a:p>
+          <a:p>
+            <a:pPr marL="1657350" lvl="3" indent="-285750" fontAlgn="base">
+              <a:buFont typeface="Arial" panose="020B0604020202020204" pitchFamily="34" charset="0"/>
+              <a:buChar char="•"/>
+            </a:pPr>
+            <a:endParaRPr lang="en-US" altLang="ko-KR" sz="1400" dirty="0"/>
+          </a:p>
+          <a:p>
             <a:pPr marL="742950" lvl="1" indent="-285750" fontAlgn="base">
               <a:buFont typeface="Arial" panose="020B0604020202020204" pitchFamily="34" charset="0"/>
               <a:buChar char="•"/>
@@ -33985,6 +34209,87 @@
               <a:buFont typeface="Arial" panose="020B0604020202020204" pitchFamily="34" charset="0"/>
               <a:buChar char="•"/>
             </a:pPr>
+            <a:endParaRPr lang="en-US" altLang="ko-KR" sz="1400" dirty="0"/>
+          </a:p>
+          <a:p>
+            <a:pPr marL="1200150" lvl="2" indent="-285750" fontAlgn="base">
+              <a:buFont typeface="Arial" panose="020B0604020202020204" pitchFamily="34" charset="0"/>
+              <a:buChar char="•"/>
+            </a:pPr>
+            <a:r>
+              <a:rPr lang="en-US" altLang="ko-KR" sz="1400" dirty="0"/>
+              <a:t>GPU </a:t>
+            </a:r>
+            <a:r>
+              <a:rPr lang="ko-KR" altLang="en-US" sz="1400" dirty="0"/>
+              <a:t>가속화 필터를 적용한 디스크 기반 키</a:t>
+            </a:r>
+            <a:r>
+              <a:rPr lang="en-US" altLang="ko-KR" sz="1400" dirty="0"/>
+              <a:t>-</a:t>
+            </a:r>
+            <a:r>
+              <a:rPr lang="ko-KR" altLang="en-US" sz="1400" dirty="0"/>
+              <a:t>값 데이터베이스</a:t>
+            </a:r>
+            <a:endParaRPr lang="en-US" altLang="ko-KR" sz="1400" dirty="0"/>
+          </a:p>
+          <a:p>
+            <a:pPr marL="1657350" lvl="3" indent="-285750" fontAlgn="base">
+              <a:buFont typeface="Arial" panose="020B0604020202020204" pitchFamily="34" charset="0"/>
+              <a:buChar char="•"/>
+            </a:pPr>
+            <a:r>
+              <a:rPr lang="ko-KR" altLang="en-US" sz="1400" dirty="0"/>
+              <a:t>김도영</a:t>
+            </a:r>
+            <a:r>
+              <a:rPr lang="en-US" altLang="ko-KR" sz="1400" dirty="0"/>
+              <a:t>, </a:t>
+            </a:r>
+            <a:r>
+              <a:rPr lang="ko-KR" altLang="en-US" sz="1400" dirty="0"/>
+              <a:t>최원기</a:t>
+            </a:r>
+            <a:r>
+              <a:rPr lang="en-US" altLang="ko-KR" sz="1400" dirty="0"/>
+              <a:t>, </a:t>
+            </a:r>
+            <a:r>
+              <a:rPr lang="ko-KR" altLang="en-US" sz="1400" dirty="0" err="1"/>
+              <a:t>노홍찬</a:t>
+            </a:r>
+            <a:r>
+              <a:rPr lang="en-US" altLang="ko-KR" sz="1400" dirty="0"/>
+              <a:t>, </a:t>
+            </a:r>
+            <a:r>
+              <a:rPr lang="ko-KR" altLang="en-US" sz="1400" dirty="0"/>
+              <a:t>박상현</a:t>
+            </a:r>
+            <a:endParaRPr lang="en-US" altLang="ko-KR" sz="1400" dirty="0"/>
+          </a:p>
+          <a:p>
+            <a:pPr marL="1657350" lvl="3" indent="-285750" fontAlgn="base">
+              <a:buFont typeface="Arial" panose="020B0604020202020204" pitchFamily="34" charset="0"/>
+              <a:buChar char="•"/>
+            </a:pPr>
+            <a:r>
+              <a:rPr lang="ko-KR" altLang="en-US" sz="1400" dirty="0" err="1"/>
+              <a:t>정보과학회실제논문지</a:t>
+            </a:r>
+            <a:r>
+              <a:rPr lang="ko-KR" altLang="en-US" sz="1400" dirty="0"/>
+              <a:t> </a:t>
+            </a:r>
+            <a:r>
+              <a:rPr lang="en-US" altLang="ko-KR" sz="1400" dirty="0"/>
+              <a:t>(</a:t>
+            </a:r>
+            <a:r>
+              <a:rPr lang="en-US" altLang="ko-KR" sz="1400"/>
+              <a:t>On Writing…)</a:t>
+            </a:r>
             <a:endParaRPr lang="en-US" altLang="ko-KR" sz="1400" dirty="0"/>
           </a:p>
         </p:txBody>
@@ -34984,12 +35289,268 @@
           <a:chExt cx="0" cy="0"/>
         </a:xfrm>
       </p:grpSpPr>
+      <p:grpSp>
+        <p:nvGrpSpPr>
+          <p:cNvPr id="3" name="그룹 2">
+            <a:extLst>
+              <a:ext uri="{FF2B5EF4-FFF2-40B4-BE49-F238E27FC236}">
+                <a16:creationId xmlns:a16="http://schemas.microsoft.com/office/drawing/2014/main" id="{79BD607B-B209-447A-B0B3-B404FC33F4C5}"/>
+              </a:ext>
+            </a:extLst>
+          </p:cNvPr>
+          <p:cNvGrpSpPr/>
+          <p:nvPr/>
+        </p:nvGrpSpPr>
+        <p:grpSpPr>
+          <a:xfrm>
+            <a:off x="-1372" y="6463226"/>
+            <a:ext cx="12193371" cy="394774"/>
+            <a:chOff x="-1371" y="6463226"/>
+            <a:chExt cx="9144000" cy="394774"/>
+          </a:xfrm>
+        </p:grpSpPr>
+        <p:sp>
+          <p:nvSpPr>
+            <p:cNvPr id="13" name="직사각형 12">
+              <a:extLst>
+                <a:ext uri="{FF2B5EF4-FFF2-40B4-BE49-F238E27FC236}">
+                  <a16:creationId xmlns:a16="http://schemas.microsoft.com/office/drawing/2014/main" id="{B5C9959C-41B6-46DB-8487-CE619EFD623C}"/>
+                </a:ext>
+              </a:extLst>
+            </p:cNvPr>
+            <p:cNvSpPr/>
+            <p:nvPr/>
+          </p:nvSpPr>
+          <p:spPr>
+            <a:xfrm>
+              <a:off x="-1371" y="6463226"/>
+              <a:ext cx="9144000" cy="206776"/>
+            </a:xfrm>
+            <a:prstGeom prst="rect">
+              <a:avLst/>
+            </a:prstGeom>
+            <a:solidFill>
+              <a:srgbClr val="F2F2F2"/>
+            </a:solidFill>
+            <a:ln>
+              <a:noFill/>
+            </a:ln>
+          </p:spPr>
+          <p:style>
+            <a:lnRef idx="2">
+              <a:schemeClr val="accent1">
+                <a:shade val="50000"/>
+              </a:schemeClr>
+            </a:lnRef>
+            <a:fillRef idx="1">
+              <a:schemeClr val="accent1"/>
+            </a:fillRef>
+            <a:effectRef idx="0">
+              <a:schemeClr val="accent1"/>
+            </a:effectRef>
+            <a:fontRef idx="minor">
+              <a:schemeClr val="lt1"/>
+            </a:fontRef>
+          </p:style>
+          <p:txBody>
+            <a:bodyPr rtlCol="0" anchor="ctr"/>
+            <a:lstStyle/>
+            <a:p>
+              <a:pPr algn="ctr"/>
+              <a:endParaRPr lang="ko-KR" altLang="en-US" dirty="0"/>
+            </a:p>
+          </p:txBody>
+        </p:sp>
+        <p:sp>
+          <p:nvSpPr>
+            <p:cNvPr id="14" name="직사각형 13">
+              <a:extLst>
+                <a:ext uri="{FF2B5EF4-FFF2-40B4-BE49-F238E27FC236}">
+                  <a16:creationId xmlns:a16="http://schemas.microsoft.com/office/drawing/2014/main" id="{9BD7145D-82EB-49F4-8842-9DD73CAA6D1F}"/>
+                </a:ext>
+              </a:extLst>
+            </p:cNvPr>
+            <p:cNvSpPr/>
+            <p:nvPr/>
+          </p:nvSpPr>
+          <p:spPr>
+            <a:xfrm>
+              <a:off x="-1371" y="6651224"/>
+              <a:ext cx="9144000" cy="206776"/>
+            </a:xfrm>
+            <a:prstGeom prst="rect">
+              <a:avLst/>
+            </a:prstGeom>
+            <a:solidFill>
+              <a:schemeClr val="tx1">
+                <a:lumMod val="75000"/>
+                <a:lumOff val="25000"/>
+              </a:schemeClr>
+            </a:solidFill>
+            <a:ln>
+              <a:noFill/>
+            </a:ln>
+          </p:spPr>
+          <p:style>
+            <a:lnRef idx="2">
+              <a:schemeClr val="accent1">
+                <a:shade val="50000"/>
+              </a:schemeClr>
+            </a:lnRef>
+            <a:fillRef idx="1">
+              <a:schemeClr val="accent1"/>
+            </a:fillRef>
+            <a:effectRef idx="0">
+              <a:schemeClr val="accent1"/>
+            </a:effectRef>
+            <a:fontRef idx="minor">
+              <a:schemeClr val="lt1"/>
+            </a:fontRef>
+          </p:style>
+          <p:txBody>
+            <a:bodyPr rtlCol="0" anchor="ctr"/>
+            <a:lstStyle/>
+            <a:p>
+              <a:pPr algn="ctr"/>
+              <a:endParaRPr lang="ko-KR" altLang="en-US"/>
+            </a:p>
+          </p:txBody>
+        </p:sp>
+      </p:grpSp>
+      <p:grpSp>
+        <p:nvGrpSpPr>
+          <p:cNvPr id="2" name="그룹 1">
+            <a:extLst>
+              <a:ext uri="{FF2B5EF4-FFF2-40B4-BE49-F238E27FC236}">
+                <a16:creationId xmlns:a16="http://schemas.microsoft.com/office/drawing/2014/main" id="{DD26DB70-737E-4B89-AA11-834AFC57A8F2}"/>
+              </a:ext>
+            </a:extLst>
+          </p:cNvPr>
+          <p:cNvGrpSpPr/>
+          <p:nvPr/>
+        </p:nvGrpSpPr>
+        <p:grpSpPr>
+          <a:xfrm>
+            <a:off x="-1372" y="0"/>
+            <a:ext cx="12193371" cy="628192"/>
+            <a:chOff x="-1371" y="0"/>
+            <a:chExt cx="9144000" cy="628192"/>
+          </a:xfrm>
+        </p:grpSpPr>
+        <p:sp>
+          <p:nvSpPr>
+            <p:cNvPr id="16" name="직사각형 15">
+              <a:extLst>
+                <a:ext uri="{FF2B5EF4-FFF2-40B4-BE49-F238E27FC236}">
+                  <a16:creationId xmlns:a16="http://schemas.microsoft.com/office/drawing/2014/main" id="{7B5EC4BA-4C34-4D86-8E72-3BA55F6E8F7B}"/>
+                </a:ext>
+              </a:extLst>
+            </p:cNvPr>
+            <p:cNvSpPr/>
+            <p:nvPr/>
+          </p:nvSpPr>
+          <p:spPr>
+            <a:xfrm>
+              <a:off x="-1371" y="166526"/>
+              <a:ext cx="9144000" cy="461666"/>
+            </a:xfrm>
+            <a:prstGeom prst="rect">
+              <a:avLst/>
+            </a:prstGeom>
+            <a:solidFill>
+              <a:srgbClr val="F2F2F2"/>
+            </a:solidFill>
+            <a:ln>
+              <a:noFill/>
+            </a:ln>
+          </p:spPr>
+          <p:style>
+            <a:lnRef idx="2">
+              <a:schemeClr val="accent1">
+                <a:shade val="50000"/>
+              </a:schemeClr>
+            </a:lnRef>
+            <a:fillRef idx="1">
+              <a:schemeClr val="accent1"/>
+            </a:fillRef>
+            <a:effectRef idx="0">
+              <a:schemeClr val="accent1"/>
+            </a:effectRef>
+            <a:fontRef idx="minor">
+              <a:schemeClr val="lt1"/>
+            </a:fontRef>
+          </p:style>
+          <p:txBody>
+            <a:bodyPr rtlCol="0" anchor="ctr"/>
+            <a:lstStyle/>
+            <a:p>
+              <a:pPr algn="ctr"/>
+              <a:endParaRPr lang="ko-KR" altLang="en-US"/>
+            </a:p>
+          </p:txBody>
+        </p:sp>
+        <p:sp>
+          <p:nvSpPr>
+            <p:cNvPr id="25" name="직사각형 24">
+              <a:extLst>
+                <a:ext uri="{FF2B5EF4-FFF2-40B4-BE49-F238E27FC236}">
+                  <a16:creationId xmlns:a16="http://schemas.microsoft.com/office/drawing/2014/main" id="{EC57564B-14B6-44D8-9A45-33BEC926A423}"/>
+                </a:ext>
+              </a:extLst>
+            </p:cNvPr>
+            <p:cNvSpPr/>
+            <p:nvPr/>
+          </p:nvSpPr>
+          <p:spPr>
+            <a:xfrm>
+              <a:off x="-1371" y="0"/>
+              <a:ext cx="9144000" cy="206776"/>
+            </a:xfrm>
+            <a:prstGeom prst="rect">
+              <a:avLst/>
+            </a:prstGeom>
+            <a:solidFill>
+              <a:schemeClr val="tx1">
+                <a:lumMod val="75000"/>
+                <a:lumOff val="25000"/>
+              </a:schemeClr>
+            </a:solidFill>
+            <a:ln>
+              <a:noFill/>
+            </a:ln>
+          </p:spPr>
+          <p:style>
+            <a:lnRef idx="2">
+              <a:schemeClr val="accent1">
+                <a:shade val="50000"/>
+              </a:schemeClr>
+            </a:lnRef>
+            <a:fillRef idx="1">
+              <a:schemeClr val="accent1"/>
+            </a:fillRef>
+            <a:effectRef idx="0">
+              <a:schemeClr val="accent1"/>
+            </a:effectRef>
+            <a:fontRef idx="minor">
+              <a:schemeClr val="lt1"/>
+            </a:fontRef>
+          </p:style>
+          <p:txBody>
+            <a:bodyPr rtlCol="0" anchor="ctr"/>
+            <a:lstStyle/>
+            <a:p>
+              <a:pPr algn="ctr"/>
+              <a:endParaRPr lang="ko-KR" altLang="en-US"/>
+            </a:p>
+          </p:txBody>
+        </p:sp>
+      </p:grpSp>
       <p:sp>
         <p:nvSpPr>
-          <p:cNvPr id="3" name="TextBox 2">
+          <p:cNvPr id="26" name="TextBox 25">
             <a:extLst>
               <a:ext uri="{FF2B5EF4-FFF2-40B4-BE49-F238E27FC236}">
-                <a16:creationId xmlns:a16="http://schemas.microsoft.com/office/drawing/2014/main" id="{D4AD2238-FA2D-4F87-9271-E5E5A198A445}"/>
+                <a16:creationId xmlns:a16="http://schemas.microsoft.com/office/drawing/2014/main" id="{470D1991-5A4E-452B-A7FC-A45DE388DEBD}"/>
               </a:ext>
             </a:extLst>
           </p:cNvPr>
@@ -34998,8 +35559,8 @@
         </p:nvSpPr>
         <p:spPr>
           <a:xfrm>
-            <a:off x="1188033" y="819901"/>
-            <a:ext cx="9742909" cy="646331"/>
+            <a:off x="667880" y="174914"/>
+            <a:ext cx="4241003" cy="461665"/>
           </a:xfrm>
           <a:prstGeom prst="rect">
             <a:avLst/>
@@ -35012,22 +35573,26 @@
           </a:bodyPr>
           <a:lstStyle/>
           <a:p>
-            <a:pPr algn="ctr"/>
-            <a:r>
-              <a:rPr lang="en-US" altLang="ko-KR" sz="3600" dirty="0">
-                <a:cs typeface="Calibri" panose="020F0502020204030204" pitchFamily="34" charset="0"/>
+            <a:r>
+              <a:rPr lang="en-US" altLang="ko-KR" sz="2400" dirty="0">
+                <a:latin typeface="+mj-lt"/>
+                <a:ea typeface="나눔바른고딕OTF Light" panose="02000303000000000000" pitchFamily="50" charset="-127"/>
               </a:rPr>
-              <a:t>3. Educations</a:t>
-            </a:r>
+              <a:t>Patents</a:t>
+            </a:r>
+            <a:endParaRPr lang="ko-KR" altLang="en-US" sz="2400" dirty="0">
+              <a:latin typeface="+mj-lt"/>
+              <a:ea typeface="나눔바른고딕OTF Light" panose="02000303000000000000" pitchFamily="50" charset="-127"/>
+            </a:endParaRPr>
           </a:p>
         </p:txBody>
       </p:sp>
       <p:cxnSp>
         <p:nvCxnSpPr>
-          <p:cNvPr id="5" name="직선 연결선 4">
+          <p:cNvPr id="27" name="직선 연결선 26">
             <a:extLst>
               <a:ext uri="{FF2B5EF4-FFF2-40B4-BE49-F238E27FC236}">
-                <a16:creationId xmlns:a16="http://schemas.microsoft.com/office/drawing/2014/main" id="{3DCED1B2-850C-4485-84CD-0111AE20B329}"/>
+                <a16:creationId xmlns:a16="http://schemas.microsoft.com/office/drawing/2014/main" id="{9C528102-5F02-4CAA-84B8-D45E657E92B2}"/>
               </a:ext>
             </a:extLst>
           </p:cNvPr>
@@ -35038,13 +35603,13 @@
         </p:nvCxnSpPr>
         <p:spPr>
           <a:xfrm>
-            <a:off x="2387600" y="1466232"/>
-            <a:ext cx="7416800" cy="0"/>
+            <a:off x="780739" y="585315"/>
+            <a:ext cx="1781486" cy="0"/>
           </a:xfrm>
           <a:prstGeom prst="line">
             <a:avLst/>
           </a:prstGeom>
-          <a:ln w="15875">
+          <a:ln w="9525">
             <a:solidFill>
               <a:schemeClr val="bg1">
                 <a:lumMod val="50000"/>
@@ -35067,43 +35632,215 @@
           </a:fontRef>
         </p:style>
       </p:cxnSp>
+      <p:grpSp>
+        <p:nvGrpSpPr>
+          <p:cNvPr id="17" name="그룹 16">
+            <a:extLst>
+              <a:ext uri="{FF2B5EF4-FFF2-40B4-BE49-F238E27FC236}">
+                <a16:creationId xmlns:a16="http://schemas.microsoft.com/office/drawing/2014/main" id="{023EEF38-74AA-4B26-A49B-0F55B6C2576F}"/>
+              </a:ext>
+            </a:extLst>
+          </p:cNvPr>
+          <p:cNvGrpSpPr/>
+          <p:nvPr/>
+        </p:nvGrpSpPr>
+        <p:grpSpPr>
+          <a:xfrm>
+            <a:off x="208501" y="199835"/>
+            <a:ext cx="441739" cy="438517"/>
+            <a:chOff x="6059605" y="286603"/>
+            <a:chExt cx="576001" cy="575783"/>
+          </a:xfrm>
+          <a:solidFill>
+            <a:schemeClr val="tx1">
+              <a:lumMod val="75000"/>
+              <a:lumOff val="25000"/>
+            </a:schemeClr>
+          </a:solidFill>
+        </p:grpSpPr>
+        <p:sp>
+          <p:nvSpPr>
+            <p:cNvPr id="18" name="직사각형 17">
+              <a:extLst>
+                <a:ext uri="{FF2B5EF4-FFF2-40B4-BE49-F238E27FC236}">
+                  <a16:creationId xmlns:a16="http://schemas.microsoft.com/office/drawing/2014/main" id="{FF39D1B7-1687-47F2-9F57-FC1DEDDB8DF8}"/>
+                </a:ext>
+              </a:extLst>
+            </p:cNvPr>
+            <p:cNvSpPr/>
+            <p:nvPr/>
+          </p:nvSpPr>
+          <p:spPr>
+            <a:xfrm>
+              <a:off x="6059605" y="286603"/>
+              <a:ext cx="576000" cy="396000"/>
+            </a:xfrm>
+            <a:prstGeom prst="rect">
+              <a:avLst/>
+            </a:prstGeom>
+            <a:grpFill/>
+            <a:ln>
+              <a:noFill/>
+            </a:ln>
+          </p:spPr>
+          <p:style>
+            <a:lnRef idx="2">
+              <a:schemeClr val="accent1">
+                <a:shade val="50000"/>
+              </a:schemeClr>
+            </a:lnRef>
+            <a:fillRef idx="1">
+              <a:schemeClr val="accent1"/>
+            </a:fillRef>
+            <a:effectRef idx="0">
+              <a:schemeClr val="accent1"/>
+            </a:effectRef>
+            <a:fontRef idx="minor">
+              <a:schemeClr val="lt1"/>
+            </a:fontRef>
+          </p:style>
+          <p:txBody>
+            <a:bodyPr rtlCol="0" anchor="ctr"/>
+            <a:lstStyle/>
+            <a:p>
+              <a:pPr algn="ctr"/>
+              <a:r>
+                <a:rPr lang="en-US" altLang="ko-KR" sz="2000" dirty="0"/>
+                <a:t>2</a:t>
+              </a:r>
+              <a:endParaRPr lang="ko-KR" altLang="en-US" sz="2000" dirty="0"/>
+            </a:p>
+          </p:txBody>
+        </p:sp>
+        <p:sp>
+          <p:nvSpPr>
+            <p:cNvPr id="22" name="순서도: 병합 21">
+              <a:extLst>
+                <a:ext uri="{FF2B5EF4-FFF2-40B4-BE49-F238E27FC236}">
+                  <a16:creationId xmlns:a16="http://schemas.microsoft.com/office/drawing/2014/main" id="{B55C180E-01CA-47AA-8905-58ADEB0B390A}"/>
+                </a:ext>
+              </a:extLst>
+            </p:cNvPr>
+            <p:cNvSpPr/>
+            <p:nvPr/>
+          </p:nvSpPr>
+          <p:spPr>
+            <a:xfrm>
+              <a:off x="6059606" y="682386"/>
+              <a:ext cx="576000" cy="180000"/>
+            </a:xfrm>
+            <a:prstGeom prst="flowChartMerge">
+              <a:avLst/>
+            </a:prstGeom>
+            <a:grpFill/>
+            <a:ln>
+              <a:noFill/>
+            </a:ln>
+          </p:spPr>
+          <p:style>
+            <a:lnRef idx="2">
+              <a:schemeClr val="accent1">
+                <a:shade val="50000"/>
+              </a:schemeClr>
+            </a:lnRef>
+            <a:fillRef idx="1">
+              <a:schemeClr val="accent1"/>
+            </a:fillRef>
+            <a:effectRef idx="0">
+              <a:schemeClr val="accent1"/>
+            </a:effectRef>
+            <a:fontRef idx="minor">
+              <a:schemeClr val="lt1"/>
+            </a:fontRef>
+          </p:style>
+          <p:txBody>
+            <a:bodyPr rtlCol="0" anchor="ctr"/>
+            <a:lstStyle/>
+            <a:p>
+              <a:pPr algn="ctr"/>
+              <a:endParaRPr lang="ko-KR" altLang="en-US"/>
+            </a:p>
+          </p:txBody>
+        </p:sp>
+      </p:grpSp>
       <p:sp>
         <p:nvSpPr>
-          <p:cNvPr id="2" name="직사각형 1">
+          <p:cNvPr id="50" name="슬라이드 번호 개체 틀 17">
             <a:extLst>
               <a:ext uri="{FF2B5EF4-FFF2-40B4-BE49-F238E27FC236}">
-                <a16:creationId xmlns:a16="http://schemas.microsoft.com/office/drawing/2014/main" id="{CEE0AB58-8AF9-4EF4-BD72-AF77AC2F43CE}"/>
+                <a16:creationId xmlns:a16="http://schemas.microsoft.com/office/drawing/2014/main" id="{86CB1A85-0014-459F-A7CB-3DFB148E5E9F}"/>
               </a:ext>
             </a:extLst>
           </p:cNvPr>
-          <p:cNvSpPr/>
+          <p:cNvSpPr>
+            <a:spLocks noGrp="1"/>
+          </p:cNvSpPr>
+          <p:nvPr>
+            <p:ph type="sldNum" sz="quarter" idx="12"/>
+          </p:nvPr>
+        </p:nvSpPr>
+        <p:spPr>
+          <a:xfrm>
+            <a:off x="10009643" y="6374526"/>
+            <a:ext cx="2133600" cy="365125"/>
+          </a:xfrm>
+        </p:spPr>
+        <p:txBody>
+          <a:bodyPr/>
+          <a:lstStyle/>
+          <a:p>
+            <a:fld id="{4F06AD41-88F5-420E-A9F3-AFB7116D4D84}" type="slidenum">
+              <a:rPr lang="ko-KR" altLang="en-US" b="1" smtClean="0">
+                <a:solidFill>
+                  <a:schemeClr val="tx1"/>
+                </a:solidFill>
+              </a:rPr>
+              <a:pPr/>
+              <a:t>39</a:t>
+            </a:fld>
+            <a:endParaRPr lang="ko-KR" altLang="en-US" b="1" dirty="0">
+              <a:solidFill>
+                <a:schemeClr val="tx1"/>
+              </a:solidFill>
+            </a:endParaRPr>
+          </a:p>
+        </p:txBody>
+      </p:sp>
+      <p:sp>
+        <p:nvSpPr>
+          <p:cNvPr id="4" name="TextBox 3">
+            <a:extLst>
+              <a:ext uri="{FF2B5EF4-FFF2-40B4-BE49-F238E27FC236}">
+                <a16:creationId xmlns:a16="http://schemas.microsoft.com/office/drawing/2014/main" id="{FAEDC897-4DC5-4C69-9A69-8CF50ADCA4DC}"/>
+              </a:ext>
+            </a:extLst>
+          </p:cNvPr>
+          <p:cNvSpPr txBox="1"/>
           <p:nvPr/>
         </p:nvSpPr>
         <p:spPr>
           <a:xfrm>
-            <a:off x="2396284" y="1649529"/>
-            <a:ext cx="7416800" cy="2862322"/>
+            <a:off x="429370" y="1015118"/>
+            <a:ext cx="11526982" cy="3447098"/>
           </a:xfrm>
           <a:prstGeom prst="rect">
             <a:avLst/>
           </a:prstGeom>
+          <a:noFill/>
         </p:spPr>
         <p:txBody>
-          <a:bodyPr wrap="square">
+          <a:bodyPr wrap="square" rtlCol="0">
             <a:spAutoFit/>
           </a:bodyPr>
           <a:lstStyle/>
           <a:p>
-            <a:pPr marL="285750" indent="-285750">
-              <a:lnSpc>
-                <a:spcPct val="150000"/>
-              </a:lnSpc>
-              <a:buFont typeface="Arial" panose="020B0604020202020204" pitchFamily="34" charset="0"/>
-              <a:buChar char="•"/>
-            </a:pPr>
-            <a:r>
-              <a:rPr lang="en-US" altLang="ko-KR" dirty="0"/>
-              <a:t>Master</a:t>
+            <a:pPr marL="285750" indent="-285750" fontAlgn="base">
+              <a:buFont typeface="Arial" panose="020B0604020202020204" pitchFamily="34" charset="0"/>
+              <a:buChar char="•"/>
+            </a:pPr>
+            <a:r>
+              <a:rPr lang="en-US" altLang="ko-KR" b="1" dirty="0"/>
+              <a:t>International</a:t>
             </a:r>
           </a:p>
           <a:p>
@@ -35112,10 +35849,9 @@
               <a:buChar char="•"/>
             </a:pPr>
             <a:r>
-              <a:rPr lang="ko-KR" altLang="en-US" sz="1200" dirty="0"/>
-              <a:t>연세대학교 컴퓨터과학과 석사</a:t>
-            </a:r>
-            <a:endParaRPr lang="en-US" altLang="ko-KR" sz="1200" dirty="0"/>
+              <a:rPr lang="en-US" altLang="ko-KR" sz="1400" dirty="0"/>
+              <a:t>Method For Processing Data In In-Memory Database Using Non-Volatile Memory And In-Memory Database</a:t>
+            </a:r>
           </a:p>
           <a:p>
             <a:pPr marL="1200150" lvl="2" indent="-285750" fontAlgn="base">
@@ -35123,22 +35859,105 @@
               <a:buChar char="•"/>
             </a:pPr>
             <a:r>
-              <a:rPr lang="ko-KR" altLang="en-US" sz="1200" dirty="0"/>
-              <a:t>데이터공학연구실 </a:t>
-            </a:r>
-            <a:r>
-              <a:rPr lang="en-US" altLang="ko-KR" sz="1200" dirty="0"/>
-              <a:t>(</a:t>
-            </a:r>
-            <a:r>
-              <a:rPr lang="en-US" altLang="ko-KR" sz="1200" dirty="0">
-                <a:hlinkClick r:id="rId3"/>
-              </a:rPr>
-              <a:t>Link</a:t>
-            </a:r>
-            <a:r>
-              <a:rPr lang="en-US" altLang="ko-KR" sz="1200" dirty="0"/>
-              <a:t>)</a:t>
+              <a:rPr lang="en-US" altLang="ko-KR" sz="1400" b="1" dirty="0"/>
+              <a:t>Applicants:</a:t>
+            </a:r>
+            <a:r>
+              <a:rPr lang="en-US" altLang="ko-KR" sz="1400" dirty="0"/>
+              <a:t>	Sanghyun Park, </a:t>
+            </a:r>
+            <a:r>
+              <a:rPr lang="en-US" altLang="ko-KR" sz="1400" u="sng" dirty="0" err="1"/>
+              <a:t>Doyoung</a:t>
+            </a:r>
+            <a:r>
+              <a:rPr lang="en-US" altLang="ko-KR" sz="1400" u="sng" dirty="0"/>
+              <a:t> Kim</a:t>
+            </a:r>
+            <a:r>
+              <a:rPr lang="en-US" altLang="ko-KR" sz="1400" dirty="0"/>
+              <a:t>, </a:t>
+            </a:r>
+            <a:r>
+              <a:rPr lang="en-US" altLang="ko-KR" sz="1400" dirty="0" err="1"/>
+              <a:t>Burgstaller</a:t>
+            </a:r>
+            <a:r>
+              <a:rPr lang="en-US" altLang="ko-KR" sz="1400" dirty="0"/>
+              <a:t> Bernd, Won Gi Choi</a:t>
+            </a:r>
+          </a:p>
+          <a:p>
+            <a:pPr marL="1200150" lvl="2" indent="-285750" fontAlgn="base">
+              <a:buFont typeface="Arial" panose="020B0604020202020204" pitchFamily="34" charset="0"/>
+              <a:buChar char="•"/>
+            </a:pPr>
+            <a:r>
+              <a:rPr lang="en-US" altLang="ko-KR" sz="1400" b="1" dirty="0"/>
+              <a:t>Country:</a:t>
+            </a:r>
+            <a:r>
+              <a:rPr lang="en-US" altLang="ko-KR" sz="1400" dirty="0"/>
+              <a:t>	US</a:t>
+            </a:r>
+          </a:p>
+          <a:p>
+            <a:pPr marL="1200150" lvl="2" indent="-285750" fontAlgn="base">
+              <a:buFont typeface="Arial" panose="020B0604020202020204" pitchFamily="34" charset="0"/>
+              <a:buChar char="•"/>
+            </a:pPr>
+            <a:r>
+              <a:rPr lang="en-US" altLang="ko-KR" sz="1400" b="1" dirty="0"/>
+              <a:t>Status:</a:t>
+            </a:r>
+            <a:r>
+              <a:rPr lang="en-US" altLang="ko-KR" sz="1400" dirty="0"/>
+              <a:t> 	Applied</a:t>
+            </a:r>
+          </a:p>
+          <a:p>
+            <a:pPr marL="1200150" lvl="2" indent="-285750" fontAlgn="base">
+              <a:buFont typeface="Arial" panose="020B0604020202020204" pitchFamily="34" charset="0"/>
+              <a:buChar char="•"/>
+            </a:pPr>
+            <a:r>
+              <a:rPr lang="en-US" altLang="ko-KR" sz="1400" b="1" dirty="0"/>
+              <a:t>ID:</a:t>
+            </a:r>
+            <a:r>
+              <a:rPr lang="en-US" altLang="ko-KR" sz="1400" dirty="0"/>
+              <a:t> 		16/442,227</a:t>
+            </a:r>
+          </a:p>
+          <a:p>
+            <a:pPr marL="1200150" lvl="2" indent="-285750" fontAlgn="base">
+              <a:buFont typeface="Arial" panose="020B0604020202020204" pitchFamily="34" charset="0"/>
+              <a:buChar char="•"/>
+            </a:pPr>
+            <a:r>
+              <a:rPr lang="en-US" altLang="ko-KR" sz="1400" b="1" dirty="0"/>
+              <a:t>Date:</a:t>
+            </a:r>
+            <a:r>
+              <a:rPr lang="en-US" altLang="ko-KR" sz="1400" dirty="0"/>
+              <a:t>		2019. 06. 14</a:t>
+            </a:r>
+          </a:p>
+          <a:p>
+            <a:pPr marL="1200150" lvl="2" indent="-285750" fontAlgn="base">
+              <a:buFont typeface="Arial" panose="020B0604020202020204" pitchFamily="34" charset="0"/>
+              <a:buChar char="•"/>
+            </a:pPr>
+            <a:endParaRPr lang="en-US" altLang="ko-KR" sz="1400" dirty="0"/>
+          </a:p>
+          <a:p>
+            <a:pPr marL="285750" indent="-285750" fontAlgn="base">
+              <a:buFont typeface="Arial" panose="020B0604020202020204" pitchFamily="34" charset="0"/>
+              <a:buChar char="•"/>
+            </a:pPr>
+            <a:r>
+              <a:rPr lang="en-US" altLang="ko-KR" b="1" dirty="0"/>
+              <a:t>Domestic</a:t>
             </a:r>
           </a:p>
           <a:p>
@@ -35147,32 +35966,10 @@
               <a:buChar char="•"/>
             </a:pPr>
             <a:r>
-              <a:rPr lang="en-US" altLang="ko-KR" sz="1200" dirty="0"/>
-              <a:t>2018.02. ~ 2020.02. </a:t>
-            </a:r>
-            <a:r>
-              <a:rPr lang="ko-KR" altLang="en-US" sz="1200" dirty="0"/>
-              <a:t>졸업 예정</a:t>
-            </a:r>
-            <a:endParaRPr lang="en-US" altLang="ko-KR" sz="1200" dirty="0"/>
-          </a:p>
-          <a:p>
-            <a:pPr marL="742950" lvl="1" indent="-285750" fontAlgn="base">
-              <a:buFont typeface="Arial" panose="020B0604020202020204" pitchFamily="34" charset="0"/>
-              <a:buChar char="•"/>
-            </a:pPr>
-            <a:r>
-              <a:rPr lang="ko-KR" altLang="en-US" sz="1200" dirty="0"/>
-              <a:t>전체 평균 학점</a:t>
-            </a:r>
-            <a:r>
-              <a:rPr lang="en-US" altLang="ko-KR" sz="1200" dirty="0"/>
-              <a:t>: </a:t>
-            </a:r>
-            <a:r>
-              <a:rPr lang="en-US" altLang="ko-KR" sz="1200" b="1" dirty="0"/>
-              <a:t>4.27 / 4.3</a:t>
-            </a:r>
+              <a:rPr lang="ko-KR" altLang="en-US" sz="1400" dirty="0"/>
+              <a:t>비휘발성 메모리를 이용한 인메모리 데이터베이스의 데이터 처리 방법 및 인메모리 데이터베이스</a:t>
+            </a:r>
+            <a:endParaRPr lang="en-US" altLang="ko-KR" sz="1400" dirty="0"/>
           </a:p>
           <a:p>
             <a:pPr marL="1200150" lvl="2" indent="-285750" fontAlgn="base">
@@ -35180,76 +35977,42 @@
               <a:buChar char="•"/>
             </a:pPr>
             <a:r>
-              <a:rPr lang="ko-KR" altLang="en-US" sz="1200" dirty="0"/>
-              <a:t>전공 평균 학점</a:t>
-            </a:r>
-            <a:r>
-              <a:rPr lang="en-US" altLang="ko-KR" sz="1200" dirty="0"/>
-              <a:t>: </a:t>
-            </a:r>
-            <a:r>
-              <a:rPr lang="en-US" altLang="ko-KR" sz="1200" b="1" dirty="0"/>
-              <a:t>4.3 / 4.3</a:t>
-            </a:r>
-          </a:p>
-          <a:p>
-            <a:pPr marL="742950" lvl="1" indent="-285750" fontAlgn="base">
-              <a:buFont typeface="Arial" panose="020B0604020202020204" pitchFamily="34" charset="0"/>
-              <a:buChar char="•"/>
-            </a:pPr>
-            <a:endParaRPr lang="en-US" altLang="ko-KR" dirty="0"/>
-          </a:p>
-          <a:p>
-            <a:pPr marL="285750" indent="-285750">
-              <a:lnSpc>
-                <a:spcPct val="150000"/>
-              </a:lnSpc>
-              <a:buFont typeface="Arial" panose="020B0604020202020204" pitchFamily="34" charset="0"/>
-              <a:buChar char="•"/>
-            </a:pPr>
-            <a:r>
-              <a:rPr lang="en-US" altLang="ko-KR" dirty="0"/>
-              <a:t>Bachelor</a:t>
-            </a:r>
-          </a:p>
-          <a:p>
-            <a:pPr marL="742950" lvl="1" indent="-285750" fontAlgn="base">
-              <a:buFont typeface="Arial" panose="020B0604020202020204" pitchFamily="34" charset="0"/>
-              <a:buChar char="•"/>
-            </a:pPr>
-            <a:r>
-              <a:rPr lang="ko-KR" altLang="en-US" sz="1200" dirty="0"/>
-              <a:t>연세대학교 컴퓨터과학과 학사</a:t>
-            </a:r>
-            <a:endParaRPr lang="en-US" altLang="ko-KR" sz="1200" dirty="0"/>
-          </a:p>
-          <a:p>
-            <a:pPr marL="742950" lvl="1" indent="-285750" fontAlgn="base">
-              <a:buFont typeface="Arial" panose="020B0604020202020204" pitchFamily="34" charset="0"/>
-              <a:buChar char="•"/>
-            </a:pPr>
-            <a:r>
-              <a:rPr lang="en-US" altLang="ko-KR" sz="1200" dirty="0"/>
-              <a:t>2012.02. ~ 2018.02.</a:t>
-            </a:r>
-          </a:p>
-          <a:p>
-            <a:pPr marL="742950" lvl="1" indent="-285750" fontAlgn="base">
-              <a:buFont typeface="Arial" panose="020B0604020202020204" pitchFamily="34" charset="0"/>
-              <a:buChar char="•"/>
-            </a:pPr>
-            <a:r>
-              <a:rPr lang="ko-KR" altLang="en-US" sz="1200" dirty="0"/>
-              <a:t>전체 평균 학점</a:t>
-            </a:r>
-            <a:r>
-              <a:rPr lang="en-US" altLang="ko-KR" sz="1200" dirty="0"/>
-              <a:t>: </a:t>
-            </a:r>
-            <a:r>
-              <a:rPr lang="en-US" altLang="ko-KR" sz="1200" b="1" dirty="0"/>
-              <a:t>3.77 / 4.3</a:t>
-            </a:r>
+              <a:rPr lang="en-US" altLang="ko-KR" sz="1400" b="1" dirty="0"/>
+              <a:t>Applicants:</a:t>
+            </a:r>
+            <a:r>
+              <a:rPr lang="en-US" altLang="ko-KR" sz="1400" dirty="0"/>
+              <a:t>	</a:t>
+            </a:r>
+            <a:r>
+              <a:rPr lang="ko-KR" altLang="en-US" sz="1400" dirty="0"/>
+              <a:t>박상현</a:t>
+            </a:r>
+            <a:r>
+              <a:rPr lang="en-US" altLang="ko-KR" sz="1400" dirty="0"/>
+              <a:t>, </a:t>
+            </a:r>
+            <a:r>
+              <a:rPr lang="ko-KR" altLang="en-US" sz="1400" u="sng" dirty="0"/>
+              <a:t>김도영</a:t>
+            </a:r>
+            <a:r>
+              <a:rPr lang="en-US" altLang="ko-KR" sz="1400" dirty="0"/>
+              <a:t>, </a:t>
+            </a:r>
+            <a:r>
+              <a:rPr lang="en-US" altLang="ko-KR" sz="1400" dirty="0" err="1"/>
+              <a:t>Burgstaller</a:t>
+            </a:r>
+            <a:r>
+              <a:rPr lang="en-US" altLang="ko-KR" sz="1400" dirty="0"/>
+              <a:t> Bernd, </a:t>
+            </a:r>
+            <a:r>
+              <a:rPr lang="ko-KR" altLang="en-US" sz="1400" dirty="0"/>
+              <a:t>최원기</a:t>
+            </a:r>
+            <a:endParaRPr lang="en-US" altLang="ko-KR" sz="1400" dirty="0"/>
           </a:p>
           <a:p>
             <a:pPr marL="1200150" lvl="2" indent="-285750" fontAlgn="base">
@@ -35257,25 +36020,72 @@
               <a:buChar char="•"/>
             </a:pPr>
             <a:r>
-              <a:rPr lang="ko-KR" altLang="en-US" sz="1200" dirty="0"/>
-              <a:t>전공 평균 학점</a:t>
-            </a:r>
-            <a:r>
-              <a:rPr lang="en-US" altLang="ko-KR" sz="1200" dirty="0"/>
-              <a:t>: </a:t>
-            </a:r>
-            <a:r>
-              <a:rPr lang="en-US" altLang="ko-KR" sz="1200" b="1" dirty="0"/>
-              <a:t>4.16 / 4.3</a:t>
-            </a:r>
-            <a:endParaRPr lang="en-US" altLang="ko-KR" sz="1100" b="1" dirty="0"/>
+              <a:rPr lang="en-US" altLang="ko-KR" sz="1400" b="1" dirty="0"/>
+              <a:t>Country:</a:t>
+            </a:r>
+            <a:r>
+              <a:rPr lang="en-US" altLang="ko-KR" sz="1400" dirty="0"/>
+              <a:t>	</a:t>
+            </a:r>
+            <a:r>
+              <a:rPr lang="ko-KR" altLang="en-US" sz="1400" dirty="0"/>
+              <a:t>대한민국</a:t>
+            </a:r>
+            <a:endParaRPr lang="en-US" altLang="ko-KR" sz="1400" dirty="0"/>
+          </a:p>
+          <a:p>
+            <a:pPr marL="1200150" lvl="2" indent="-285750" fontAlgn="base">
+              <a:buFont typeface="Arial" panose="020B0604020202020204" pitchFamily="34" charset="0"/>
+              <a:buChar char="•"/>
+            </a:pPr>
+            <a:r>
+              <a:rPr lang="en-US" altLang="ko-KR" sz="1400" b="1" dirty="0"/>
+              <a:t>Status:</a:t>
+            </a:r>
+            <a:r>
+              <a:rPr lang="en-US" altLang="ko-KR" sz="1400" dirty="0"/>
+              <a:t>		</a:t>
+            </a:r>
+            <a:r>
+              <a:rPr lang="ko-KR" altLang="en-US" sz="1400" dirty="0"/>
+              <a:t>출원</a:t>
+            </a:r>
+            <a:endParaRPr lang="en-US" altLang="ko-KR" sz="1400" dirty="0"/>
+          </a:p>
+          <a:p>
+            <a:pPr marL="1200150" lvl="2" indent="-285750" fontAlgn="base">
+              <a:buFont typeface="Arial" panose="020B0604020202020204" pitchFamily="34" charset="0"/>
+              <a:buChar char="•"/>
+            </a:pPr>
+            <a:r>
+              <a:rPr lang="en-US" altLang="ko-KR" sz="1400" b="1" dirty="0"/>
+              <a:t>ID:</a:t>
+            </a:r>
+            <a:r>
+              <a:rPr lang="en-US" altLang="ko-KR" sz="1400" dirty="0"/>
+              <a:t>		10-2018-0068039</a:t>
+            </a:r>
+          </a:p>
+          <a:p>
+            <a:pPr marL="1200150" lvl="2" indent="-285750" fontAlgn="base">
+              <a:buFont typeface="Arial" panose="020B0604020202020204" pitchFamily="34" charset="0"/>
+              <a:buChar char="•"/>
+            </a:pPr>
+            <a:r>
+              <a:rPr lang="en-US" altLang="ko-KR" sz="1400" b="1" dirty="0"/>
+              <a:t>Date:</a:t>
+            </a:r>
+            <a:r>
+              <a:rPr lang="en-US" altLang="ko-KR" sz="1400" dirty="0"/>
+              <a:t>		2018. 06. 14</a:t>
+            </a:r>
           </a:p>
         </p:txBody>
       </p:sp>
     </p:spTree>
     <p:extLst>
       <p:ext uri="{BB962C8B-B14F-4D97-AF65-F5344CB8AC3E}">
-        <p14:creationId xmlns:p14="http://schemas.microsoft.com/office/powerpoint/2010/main" val="2569875912"/>
+        <p14:creationId xmlns:p14="http://schemas.microsoft.com/office/powerpoint/2010/main" val="3701784206"/>
       </p:ext>
     </p:extLst>
   </p:cSld>
@@ -39016,7 +39826,7 @@
               <a:rPr lang="en-US" altLang="ko-KR" sz="3600" dirty="0">
                 <a:cs typeface="Calibri" panose="020F0502020204030204" pitchFamily="34" charset="0"/>
               </a:rPr>
-              <a:t>4. Awards</a:t>
+              <a:t>3. Educations</a:t>
             </a:r>
           </a:p>
         </p:txBody>
@@ -39081,7 +39891,7 @@
         <p:spPr>
           <a:xfrm>
             <a:off x="2396284" y="1649529"/>
-            <a:ext cx="7408116" cy="2862322"/>
+            <a:ext cx="7416800" cy="2862322"/>
           </a:xfrm>
           <a:prstGeom prst="rect">
             <a:avLst/>
@@ -39102,7 +39912,7 @@
             </a:pPr>
             <a:r>
               <a:rPr lang="en-US" altLang="ko-KR" dirty="0"/>
-              <a:t>GPA</a:t>
+              <a:t>Master</a:t>
             </a:r>
           </a:p>
           <a:p>
@@ -39112,23 +39922,28 @@
             </a:pPr>
             <a:r>
               <a:rPr lang="ko-KR" altLang="en-US" sz="1200" dirty="0"/>
-              <a:t>연세대학교 학점 우수상 </a:t>
+              <a:t>연세대학교 컴퓨터과학과 석사</a:t>
+            </a:r>
+            <a:endParaRPr lang="en-US" altLang="ko-KR" sz="1200" dirty="0"/>
+          </a:p>
+          <a:p>
+            <a:pPr marL="1200150" lvl="2" indent="-285750" fontAlgn="base">
+              <a:buFont typeface="Arial" panose="020B0604020202020204" pitchFamily="34" charset="0"/>
+              <a:buChar char="•"/>
+            </a:pPr>
+            <a:r>
+              <a:rPr lang="ko-KR" altLang="en-US" sz="1200" dirty="0"/>
+              <a:t>데이터공학연구실 </a:t>
             </a:r>
             <a:r>
               <a:rPr lang="en-US" altLang="ko-KR" sz="1200" dirty="0"/>
-              <a:t>(2014. 3</a:t>
-            </a:r>
-            <a:r>
-              <a:rPr lang="ko-KR" altLang="en-US" sz="1200" dirty="0"/>
-              <a:t>학년 </a:t>
-            </a:r>
-            <a:r>
-              <a:rPr lang="en-US" altLang="ko-KR" sz="1200" dirty="0"/>
-              <a:t>1</a:t>
-            </a:r>
-            <a:r>
-              <a:rPr lang="ko-KR" altLang="en-US" sz="1200" dirty="0"/>
-              <a:t>학기</a:t>
+              <a:t>(</a:t>
+            </a:r>
+            <a:r>
+              <a:rPr lang="en-US" altLang="ko-KR" sz="1200" dirty="0">
+                <a:hlinkClick r:id="rId3"/>
+              </a:rPr>
+              <a:t>Link</a:t>
             </a:r>
             <a:r>
               <a:rPr lang="en-US" altLang="ko-KR" sz="1200" dirty="0"/>
@@ -39141,66 +39956,49 @@
               <a:buChar char="•"/>
             </a:pPr>
             <a:r>
+              <a:rPr lang="en-US" altLang="ko-KR" sz="1200" dirty="0"/>
+              <a:t>2018.02. ~ 2020.02. </a:t>
+            </a:r>
+            <a:r>
               <a:rPr lang="ko-KR" altLang="en-US" sz="1200" dirty="0"/>
-              <a:t>연세대학교 학점 우수상 </a:t>
+              <a:t>졸업 예정</a:t>
+            </a:r>
+            <a:endParaRPr lang="en-US" altLang="ko-KR" sz="1200" dirty="0"/>
+          </a:p>
+          <a:p>
+            <a:pPr marL="742950" lvl="1" indent="-285750" fontAlgn="base">
+              <a:buFont typeface="Arial" panose="020B0604020202020204" pitchFamily="34" charset="0"/>
+              <a:buChar char="•"/>
+            </a:pPr>
+            <a:r>
+              <a:rPr lang="ko-KR" altLang="en-US" sz="1200" dirty="0"/>
+              <a:t>전체 평균 학점</a:t>
             </a:r>
             <a:r>
               <a:rPr lang="en-US" altLang="ko-KR" sz="1200" dirty="0"/>
-              <a:t>(2013. 2</a:t>
-            </a:r>
+              <a:t>: </a:t>
+            </a:r>
+            <a:r>
+              <a:rPr lang="en-US" altLang="ko-KR" sz="1200" b="1" dirty="0"/>
+              <a:t>4.27 / 4.3</a:t>
+            </a:r>
+          </a:p>
+          <a:p>
+            <a:pPr marL="1200150" lvl="2" indent="-285750" fontAlgn="base">
+              <a:buFont typeface="Arial" panose="020B0604020202020204" pitchFamily="34" charset="0"/>
+              <a:buChar char="•"/>
+            </a:pPr>
             <a:r>
               <a:rPr lang="ko-KR" altLang="en-US" sz="1200" dirty="0"/>
-              <a:t>학년 </a:t>
+              <a:t>전공 평균 학점</a:t>
             </a:r>
             <a:r>
               <a:rPr lang="en-US" altLang="ko-KR" sz="1200" dirty="0"/>
-              <a:t>2</a:t>
-            </a:r>
-            <a:r>
-              <a:rPr lang="ko-KR" altLang="en-US" sz="1200" dirty="0"/>
-              <a:t>학기</a:t>
-            </a:r>
-            <a:r>
-              <a:rPr lang="en-US" altLang="ko-KR" sz="1200" dirty="0"/>
-              <a:t>)</a:t>
-            </a:r>
-          </a:p>
-          <a:p>
-            <a:pPr marL="742950" lvl="1" indent="-285750" fontAlgn="base">
-              <a:buFont typeface="Arial" panose="020B0604020202020204" pitchFamily="34" charset="0"/>
-              <a:buChar char="•"/>
-            </a:pPr>
-            <a:r>
-              <a:rPr lang="ko-KR" altLang="en-US" sz="1200" dirty="0"/>
-              <a:t>연세대학교 학점 최우수상 </a:t>
-            </a:r>
-            <a:r>
-              <a:rPr lang="en-US" altLang="ko-KR" sz="1200" dirty="0"/>
-              <a:t>(2013.</a:t>
-            </a:r>
-            <a:r>
-              <a:rPr lang="ko-KR" altLang="en-US" sz="1200" dirty="0"/>
-              <a:t> </a:t>
-            </a:r>
-            <a:r>
-              <a:rPr lang="en-US" altLang="ko-KR" sz="1200" dirty="0"/>
-              <a:t>2</a:t>
-            </a:r>
-            <a:r>
-              <a:rPr lang="ko-KR" altLang="en-US" sz="1200" dirty="0"/>
-              <a:t>학년 </a:t>
-            </a:r>
-            <a:r>
-              <a:rPr lang="en-US" altLang="ko-KR" sz="1200" dirty="0"/>
-              <a:t>1</a:t>
-            </a:r>
-            <a:r>
-              <a:rPr lang="ko-KR" altLang="en-US" sz="1200" dirty="0"/>
-              <a:t>학기</a:t>
-            </a:r>
-            <a:r>
-              <a:rPr lang="en-US" altLang="ko-KR" sz="1200" dirty="0"/>
-              <a:t>)</a:t>
+              <a:t>: </a:t>
+            </a:r>
+            <a:r>
+              <a:rPr lang="en-US" altLang="ko-KR" sz="1200" b="1" dirty="0"/>
+              <a:t>4.3 / 4.3</a:t>
             </a:r>
           </a:p>
           <a:p>
@@ -39220,7 +40018,7 @@
             </a:pPr>
             <a:r>
               <a:rPr lang="en-US" altLang="ko-KR" dirty="0"/>
-              <a:t>Paper</a:t>
+              <a:t>Bachelor</a:t>
             </a:r>
           </a:p>
           <a:p>
@@ -39229,8 +40027,37 @@
               <a:buChar char="•"/>
             </a:pPr>
             <a:r>
+              <a:rPr lang="ko-KR" altLang="en-US" sz="1200" dirty="0"/>
+              <a:t>연세대학교 컴퓨터과학과 학사</a:t>
+            </a:r>
+            <a:endParaRPr lang="en-US" altLang="ko-KR" sz="1200" dirty="0"/>
+          </a:p>
+          <a:p>
+            <a:pPr marL="742950" lvl="1" indent="-285750" fontAlgn="base">
+              <a:buFont typeface="Arial" panose="020B0604020202020204" pitchFamily="34" charset="0"/>
+              <a:buChar char="•"/>
+            </a:pPr>
+            <a:r>
               <a:rPr lang="en-US" altLang="ko-KR" sz="1200" dirty="0"/>
-              <a:t>Best Paper Present Awards</a:t>
+              <a:t>2012.02. ~ 2018.02.</a:t>
+            </a:r>
+          </a:p>
+          <a:p>
+            <a:pPr marL="742950" lvl="1" indent="-285750" fontAlgn="base">
+              <a:buFont typeface="Arial" panose="020B0604020202020204" pitchFamily="34" charset="0"/>
+              <a:buChar char="•"/>
+            </a:pPr>
+            <a:r>
+              <a:rPr lang="ko-KR" altLang="en-US" sz="1200" dirty="0"/>
+              <a:t>전체 평균 학점</a:t>
+            </a:r>
+            <a:r>
+              <a:rPr lang="en-US" altLang="ko-KR" sz="1200" dirty="0"/>
+              <a:t>: </a:t>
+            </a:r>
+            <a:r>
+              <a:rPr lang="en-US" altLang="ko-KR" sz="1200" b="1" dirty="0"/>
+              <a:t>3.77 / 4.3</a:t>
             </a:r>
           </a:p>
           <a:p>
@@ -39240,64 +40067,24 @@
             </a:pPr>
             <a:r>
               <a:rPr lang="ko-KR" altLang="en-US" sz="1200" dirty="0"/>
-              <a:t>한국정보과학회 한국컴퓨터종합학술대회</a:t>
+              <a:t>전공 평균 학점</a:t>
             </a:r>
             <a:r>
               <a:rPr lang="en-US" altLang="ko-KR" sz="1200" dirty="0"/>
-              <a:t>, KCC2019</a:t>
-            </a:r>
-          </a:p>
-          <a:p>
-            <a:pPr marL="742950" lvl="1" indent="-285750" fontAlgn="base">
-              <a:buFont typeface="Arial" panose="020B0604020202020204" pitchFamily="34" charset="0"/>
-              <a:buChar char="•"/>
-            </a:pPr>
-            <a:r>
-              <a:rPr lang="en-US" altLang="ko-KR" sz="1200" dirty="0"/>
-              <a:t>Best Poster Paper Awards</a:t>
-            </a:r>
-          </a:p>
-          <a:p>
-            <a:pPr marL="1200150" lvl="2" indent="-285750" fontAlgn="base">
-              <a:buFont typeface="Arial" panose="020B0604020202020204" pitchFamily="34" charset="0"/>
-              <a:buChar char="•"/>
-            </a:pPr>
-            <a:r>
-              <a:rPr lang="en-US" altLang="ko-KR" sz="1200" dirty="0"/>
-              <a:t>SAC 2019</a:t>
-            </a:r>
-          </a:p>
-          <a:p>
-            <a:pPr marL="742950" lvl="1" indent="-285750" fontAlgn="base">
-              <a:buFont typeface="Arial" panose="020B0604020202020204" pitchFamily="34" charset="0"/>
-              <a:buChar char="•"/>
-            </a:pPr>
-            <a:r>
-              <a:rPr lang="en-US" altLang="ko-KR" sz="1200" dirty="0"/>
-              <a:t>Best Paper Awards</a:t>
-            </a:r>
-          </a:p>
-          <a:p>
-            <a:pPr marL="1200150" lvl="2" indent="-285750" fontAlgn="base">
-              <a:buFont typeface="Arial" panose="020B0604020202020204" pitchFamily="34" charset="0"/>
-              <a:buChar char="•"/>
-            </a:pPr>
-            <a:r>
-              <a:rPr lang="ko-KR" altLang="en-US" sz="1200" dirty="0"/>
-              <a:t>한국정보과학회 한국컴퓨터종합학술대회</a:t>
-            </a:r>
-            <a:r>
-              <a:rPr lang="en-US" altLang="ko-KR" sz="1200" dirty="0"/>
-              <a:t>, KCC2018</a:t>
-            </a:r>
-            <a:endParaRPr lang="en-US" altLang="ko-KR" sz="1400" dirty="0"/>
+              <a:t>: </a:t>
+            </a:r>
+            <a:r>
+              <a:rPr lang="en-US" altLang="ko-KR" sz="1200" b="1" dirty="0"/>
+              <a:t>4.16 / 4.3</a:t>
+            </a:r>
+            <a:endParaRPr lang="en-US" altLang="ko-KR" sz="1100" b="1" dirty="0"/>
           </a:p>
         </p:txBody>
       </p:sp>
     </p:spTree>
     <p:extLst>
       <p:ext uri="{BB962C8B-B14F-4D97-AF65-F5344CB8AC3E}">
-        <p14:creationId xmlns:p14="http://schemas.microsoft.com/office/powerpoint/2010/main" val="3467793233"/>
+        <p14:creationId xmlns:p14="http://schemas.microsoft.com/office/powerpoint/2010/main" val="2569875912"/>
       </p:ext>
     </p:extLst>
   </p:cSld>
@@ -39357,7 +40144,7 @@
               <a:rPr lang="en-US" altLang="ko-KR" sz="3600" dirty="0">
                 <a:cs typeface="Calibri" panose="020F0502020204030204" pitchFamily="34" charset="0"/>
               </a:rPr>
-              <a:t>5. About Me</a:t>
+              <a:t>4. Awards</a:t>
             </a:r>
           </a:p>
         </p:txBody>
@@ -39422,6 +40209,347 @@
         <p:spPr>
           <a:xfrm>
             <a:off x="2396284" y="1649529"/>
+            <a:ext cx="7408116" cy="2862322"/>
+          </a:xfrm>
+          <a:prstGeom prst="rect">
+            <a:avLst/>
+          </a:prstGeom>
+        </p:spPr>
+        <p:txBody>
+          <a:bodyPr wrap="square">
+            <a:spAutoFit/>
+          </a:bodyPr>
+          <a:lstStyle/>
+          <a:p>
+            <a:pPr marL="285750" indent="-285750">
+              <a:lnSpc>
+                <a:spcPct val="150000"/>
+              </a:lnSpc>
+              <a:buFont typeface="Arial" panose="020B0604020202020204" pitchFamily="34" charset="0"/>
+              <a:buChar char="•"/>
+            </a:pPr>
+            <a:r>
+              <a:rPr lang="en-US" altLang="ko-KR" dirty="0"/>
+              <a:t>GPA</a:t>
+            </a:r>
+          </a:p>
+          <a:p>
+            <a:pPr marL="742950" lvl="1" indent="-285750" fontAlgn="base">
+              <a:buFont typeface="Arial" panose="020B0604020202020204" pitchFamily="34" charset="0"/>
+              <a:buChar char="•"/>
+            </a:pPr>
+            <a:r>
+              <a:rPr lang="ko-KR" altLang="en-US" sz="1200" dirty="0"/>
+              <a:t>연세대학교 학점 우수상 </a:t>
+            </a:r>
+            <a:r>
+              <a:rPr lang="en-US" altLang="ko-KR" sz="1200" dirty="0"/>
+              <a:t>(2014. 3</a:t>
+            </a:r>
+            <a:r>
+              <a:rPr lang="ko-KR" altLang="en-US" sz="1200" dirty="0"/>
+              <a:t>학년 </a:t>
+            </a:r>
+            <a:r>
+              <a:rPr lang="en-US" altLang="ko-KR" sz="1200" dirty="0"/>
+              <a:t>1</a:t>
+            </a:r>
+            <a:r>
+              <a:rPr lang="ko-KR" altLang="en-US" sz="1200" dirty="0"/>
+              <a:t>학기</a:t>
+            </a:r>
+            <a:r>
+              <a:rPr lang="en-US" altLang="ko-KR" sz="1200" dirty="0"/>
+              <a:t>)</a:t>
+            </a:r>
+          </a:p>
+          <a:p>
+            <a:pPr marL="742950" lvl="1" indent="-285750" fontAlgn="base">
+              <a:buFont typeface="Arial" panose="020B0604020202020204" pitchFamily="34" charset="0"/>
+              <a:buChar char="•"/>
+            </a:pPr>
+            <a:r>
+              <a:rPr lang="ko-KR" altLang="en-US" sz="1200" dirty="0"/>
+              <a:t>연세대학교 학점 우수상 </a:t>
+            </a:r>
+            <a:r>
+              <a:rPr lang="en-US" altLang="ko-KR" sz="1200" dirty="0"/>
+              <a:t>(2013. 2</a:t>
+            </a:r>
+            <a:r>
+              <a:rPr lang="ko-KR" altLang="en-US" sz="1200" dirty="0"/>
+              <a:t>학년 </a:t>
+            </a:r>
+            <a:r>
+              <a:rPr lang="en-US" altLang="ko-KR" sz="1200" dirty="0"/>
+              <a:t>2</a:t>
+            </a:r>
+            <a:r>
+              <a:rPr lang="ko-KR" altLang="en-US" sz="1200" dirty="0"/>
+              <a:t>학기</a:t>
+            </a:r>
+            <a:r>
+              <a:rPr lang="en-US" altLang="ko-KR" sz="1200" dirty="0"/>
+              <a:t>)</a:t>
+            </a:r>
+          </a:p>
+          <a:p>
+            <a:pPr marL="742950" lvl="1" indent="-285750" fontAlgn="base">
+              <a:buFont typeface="Arial" panose="020B0604020202020204" pitchFamily="34" charset="0"/>
+              <a:buChar char="•"/>
+            </a:pPr>
+            <a:r>
+              <a:rPr lang="ko-KR" altLang="en-US" sz="1200" dirty="0"/>
+              <a:t>연세대학교 학점 최우수상 </a:t>
+            </a:r>
+            <a:r>
+              <a:rPr lang="en-US" altLang="ko-KR" sz="1200" dirty="0"/>
+              <a:t>(2013.</a:t>
+            </a:r>
+            <a:r>
+              <a:rPr lang="ko-KR" altLang="en-US" sz="1200" dirty="0"/>
+              <a:t> </a:t>
+            </a:r>
+            <a:r>
+              <a:rPr lang="en-US" altLang="ko-KR" sz="1200" dirty="0"/>
+              <a:t>2</a:t>
+            </a:r>
+            <a:r>
+              <a:rPr lang="ko-KR" altLang="en-US" sz="1200" dirty="0"/>
+              <a:t>학년 </a:t>
+            </a:r>
+            <a:r>
+              <a:rPr lang="en-US" altLang="ko-KR" sz="1200" dirty="0"/>
+              <a:t>1</a:t>
+            </a:r>
+            <a:r>
+              <a:rPr lang="ko-KR" altLang="en-US" sz="1200" dirty="0"/>
+              <a:t>학기</a:t>
+            </a:r>
+            <a:r>
+              <a:rPr lang="en-US" altLang="ko-KR" sz="1200" dirty="0"/>
+              <a:t>)</a:t>
+            </a:r>
+          </a:p>
+          <a:p>
+            <a:pPr marL="742950" lvl="1" indent="-285750" fontAlgn="base">
+              <a:buFont typeface="Arial" panose="020B0604020202020204" pitchFamily="34" charset="0"/>
+              <a:buChar char="•"/>
+            </a:pPr>
+            <a:endParaRPr lang="en-US" altLang="ko-KR" dirty="0"/>
+          </a:p>
+          <a:p>
+            <a:pPr marL="285750" indent="-285750">
+              <a:lnSpc>
+                <a:spcPct val="150000"/>
+              </a:lnSpc>
+              <a:buFont typeface="Arial" panose="020B0604020202020204" pitchFamily="34" charset="0"/>
+              <a:buChar char="•"/>
+            </a:pPr>
+            <a:r>
+              <a:rPr lang="en-US" altLang="ko-KR" dirty="0"/>
+              <a:t>Paper</a:t>
+            </a:r>
+          </a:p>
+          <a:p>
+            <a:pPr marL="742950" lvl="1" indent="-285750" fontAlgn="base">
+              <a:buFont typeface="Arial" panose="020B0604020202020204" pitchFamily="34" charset="0"/>
+              <a:buChar char="•"/>
+            </a:pPr>
+            <a:r>
+              <a:rPr lang="en-US" altLang="ko-KR" sz="1200" dirty="0"/>
+              <a:t>Best Paper Present Awards</a:t>
+            </a:r>
+          </a:p>
+          <a:p>
+            <a:pPr marL="1200150" lvl="2" indent="-285750" fontAlgn="base">
+              <a:buFont typeface="Arial" panose="020B0604020202020204" pitchFamily="34" charset="0"/>
+              <a:buChar char="•"/>
+            </a:pPr>
+            <a:r>
+              <a:rPr lang="ko-KR" altLang="en-US" sz="1200" dirty="0"/>
+              <a:t>한국정보과학회 한국컴퓨터종합학술대회</a:t>
+            </a:r>
+            <a:r>
+              <a:rPr lang="en-US" altLang="ko-KR" sz="1200" dirty="0"/>
+              <a:t>, KCC2019</a:t>
+            </a:r>
+          </a:p>
+          <a:p>
+            <a:pPr marL="742950" lvl="1" indent="-285750" fontAlgn="base">
+              <a:buFont typeface="Arial" panose="020B0604020202020204" pitchFamily="34" charset="0"/>
+              <a:buChar char="•"/>
+            </a:pPr>
+            <a:r>
+              <a:rPr lang="en-US" altLang="ko-KR" sz="1200" dirty="0"/>
+              <a:t>Best Poster Paper Awards</a:t>
+            </a:r>
+          </a:p>
+          <a:p>
+            <a:pPr marL="1200150" lvl="2" indent="-285750" fontAlgn="base">
+              <a:buFont typeface="Arial" panose="020B0604020202020204" pitchFamily="34" charset="0"/>
+              <a:buChar char="•"/>
+            </a:pPr>
+            <a:r>
+              <a:rPr lang="en-US" altLang="ko-KR" sz="1200" dirty="0"/>
+              <a:t>SAC 2019</a:t>
+            </a:r>
+          </a:p>
+          <a:p>
+            <a:pPr marL="742950" lvl="1" indent="-285750" fontAlgn="base">
+              <a:buFont typeface="Arial" panose="020B0604020202020204" pitchFamily="34" charset="0"/>
+              <a:buChar char="•"/>
+            </a:pPr>
+            <a:r>
+              <a:rPr lang="en-US" altLang="ko-KR" sz="1200" dirty="0"/>
+              <a:t>Best Paper Awards</a:t>
+            </a:r>
+          </a:p>
+          <a:p>
+            <a:pPr marL="1200150" lvl="2" indent="-285750" fontAlgn="base">
+              <a:buFont typeface="Arial" panose="020B0604020202020204" pitchFamily="34" charset="0"/>
+              <a:buChar char="•"/>
+            </a:pPr>
+            <a:r>
+              <a:rPr lang="ko-KR" altLang="en-US" sz="1200" dirty="0"/>
+              <a:t>한국정보과학회 한국컴퓨터종합학술대회</a:t>
+            </a:r>
+            <a:r>
+              <a:rPr lang="en-US" altLang="ko-KR" sz="1200" dirty="0"/>
+              <a:t>, KCC2018</a:t>
+            </a:r>
+            <a:endParaRPr lang="en-US" altLang="ko-KR" sz="1400" dirty="0"/>
+          </a:p>
+        </p:txBody>
+      </p:sp>
+    </p:spTree>
+    <p:extLst>
+      <p:ext uri="{BB962C8B-B14F-4D97-AF65-F5344CB8AC3E}">
+        <p14:creationId xmlns:p14="http://schemas.microsoft.com/office/powerpoint/2010/main" val="3467793233"/>
+      </p:ext>
+    </p:extLst>
+  </p:cSld>
+  <p:clrMapOvr>
+    <a:masterClrMapping/>
+  </p:clrMapOvr>
+</p:sld>
+</file>
+
+<file path=ppt/slides/slide42.xml><?xml version="1.0" encoding="utf-8"?>
+<p:sld xmlns:a="http://schemas.openxmlformats.org/drawingml/2006/main" xmlns:r="http://schemas.openxmlformats.org/officeDocument/2006/relationships" xmlns:p="http://schemas.openxmlformats.org/presentationml/2006/main">
+  <p:cSld>
+    <p:spTree>
+      <p:nvGrpSpPr>
+        <p:cNvPr id="1" name=""/>
+        <p:cNvGrpSpPr/>
+        <p:nvPr/>
+      </p:nvGrpSpPr>
+      <p:grpSpPr>
+        <a:xfrm>
+          <a:off x="0" y="0"/>
+          <a:ext cx="0" cy="0"/>
+          <a:chOff x="0" y="0"/>
+          <a:chExt cx="0" cy="0"/>
+        </a:xfrm>
+      </p:grpSpPr>
+      <p:sp>
+        <p:nvSpPr>
+          <p:cNvPr id="3" name="TextBox 2">
+            <a:extLst>
+              <a:ext uri="{FF2B5EF4-FFF2-40B4-BE49-F238E27FC236}">
+                <a16:creationId xmlns:a16="http://schemas.microsoft.com/office/drawing/2014/main" id="{D4AD2238-FA2D-4F87-9271-E5E5A198A445}"/>
+              </a:ext>
+            </a:extLst>
+          </p:cNvPr>
+          <p:cNvSpPr txBox="1"/>
+          <p:nvPr/>
+        </p:nvSpPr>
+        <p:spPr>
+          <a:xfrm>
+            <a:off x="1188033" y="819901"/>
+            <a:ext cx="9742909" cy="646331"/>
+          </a:xfrm>
+          <a:prstGeom prst="rect">
+            <a:avLst/>
+          </a:prstGeom>
+          <a:noFill/>
+        </p:spPr>
+        <p:txBody>
+          <a:bodyPr wrap="square" rtlCol="0">
+            <a:spAutoFit/>
+          </a:bodyPr>
+          <a:lstStyle/>
+          <a:p>
+            <a:pPr algn="ctr"/>
+            <a:r>
+              <a:rPr lang="en-US" altLang="ko-KR" sz="3600" dirty="0">
+                <a:cs typeface="Calibri" panose="020F0502020204030204" pitchFamily="34" charset="0"/>
+              </a:rPr>
+              <a:t>5. About Me</a:t>
+            </a:r>
+          </a:p>
+        </p:txBody>
+      </p:sp>
+      <p:cxnSp>
+        <p:nvCxnSpPr>
+          <p:cNvPr id="5" name="직선 연결선 4">
+            <a:extLst>
+              <a:ext uri="{FF2B5EF4-FFF2-40B4-BE49-F238E27FC236}">
+                <a16:creationId xmlns:a16="http://schemas.microsoft.com/office/drawing/2014/main" id="{3DCED1B2-850C-4485-84CD-0111AE20B329}"/>
+              </a:ext>
+            </a:extLst>
+          </p:cNvPr>
+          <p:cNvCxnSpPr>
+            <a:cxnSpLocks/>
+          </p:cNvCxnSpPr>
+          <p:nvPr/>
+        </p:nvCxnSpPr>
+        <p:spPr>
+          <a:xfrm>
+            <a:off x="2387600" y="1466232"/>
+            <a:ext cx="7416800" cy="0"/>
+          </a:xfrm>
+          <a:prstGeom prst="line">
+            <a:avLst/>
+          </a:prstGeom>
+          <a:ln w="15875">
+            <a:solidFill>
+              <a:schemeClr val="bg1">
+                <a:lumMod val="50000"/>
+              </a:schemeClr>
+            </a:solidFill>
+          </a:ln>
+        </p:spPr>
+        <p:style>
+          <a:lnRef idx="1">
+            <a:schemeClr val="accent1"/>
+          </a:lnRef>
+          <a:fillRef idx="0">
+            <a:schemeClr val="accent1"/>
+          </a:fillRef>
+          <a:effectRef idx="0">
+            <a:schemeClr val="accent1"/>
+          </a:effectRef>
+          <a:fontRef idx="minor">
+            <a:schemeClr val="tx1"/>
+          </a:fontRef>
+        </p:style>
+      </p:cxnSp>
+      <p:sp>
+        <p:nvSpPr>
+          <p:cNvPr id="2" name="직사각형 1">
+            <a:extLst>
+              <a:ext uri="{FF2B5EF4-FFF2-40B4-BE49-F238E27FC236}">
+                <a16:creationId xmlns:a16="http://schemas.microsoft.com/office/drawing/2014/main" id="{CEE0AB58-8AF9-4EF4-BD72-AF77AC2F43CE}"/>
+              </a:ext>
+            </a:extLst>
+          </p:cNvPr>
+          <p:cNvSpPr/>
+          <p:nvPr/>
+        </p:nvSpPr>
+        <p:spPr>
+          <a:xfrm>
+            <a:off x="2396284" y="1649529"/>
             <a:ext cx="7408116" cy="3112712"/>
           </a:xfrm>
           <a:prstGeom prst="rect">
@@ -39608,7 +40736,7 @@
 </p:sld>
 </file>
 
-<file path=ppt/slides/slide42.xml><?xml version="1.0" encoding="utf-8"?>
+<file path=ppt/slides/slide43.xml><?xml version="1.0" encoding="utf-8"?>
 <p:sld xmlns:a="http://schemas.openxmlformats.org/drawingml/2006/main" xmlns:r="http://schemas.openxmlformats.org/officeDocument/2006/relationships" xmlns:p="http://schemas.openxmlformats.org/presentationml/2006/main">
   <p:cSld>
     <p:spTree>

</xml_diff>